<commit_message>
added bas work to slides
</commit_message>
<xml_diff>
--- a/Presentatie/Stand van zaken 11 april.pptx
+++ b/Presentatie/Stand van zaken 11 april.pptx
@@ -118,15 +118,54 @@
 </p:presentation>
 </file>
 
+<file path=ppt/revisionInfo.xml><?xml version="1.0" encoding="utf-8"?>
+<p1510:revInfo xmlns:a="http://schemas.openxmlformats.org/drawingml/2006/main" xmlns:r="http://schemas.openxmlformats.org/officeDocument/2006/relationships" xmlns:p1510="http://schemas.microsoft.com/office/powerpoint/2015/10/main">
+  <p1510:revLst>
+    <p1510:client id="{1D9303ED-E82D-4FA1-A83D-93429506A345}" v="1" dt="2022-04-10T12:38:13.080"/>
+  </p1510:revLst>
+</p1510:revInfo>
+</file>
+
 <file path=ppt/changesInfos/changesInfo1.xml><?xml version="1.0" encoding="utf-8"?>
 <pc:chgInfo xmlns:a="http://schemas.openxmlformats.org/drawingml/2006/main" xmlns:r="http://schemas.openxmlformats.org/officeDocument/2006/relationships" xmlns:ac="http://schemas.microsoft.com/office/drawing/2013/main/command" xmlns:pc="http://schemas.microsoft.com/office/powerpoint/2013/main/command">
   <pc:docChgLst>
     <pc:chgData name="William Brugge, van der" userId="cd30b346-2f8f-43b5-80cb-537f8c94a9d1" providerId="ADAL" clId="{1D9303ED-E82D-4FA1-A83D-93429506A345}"/>
     <pc:docChg chg="custSel addSld modSld">
-      <pc:chgData name="William Brugge, van der" userId="cd30b346-2f8f-43b5-80cb-537f8c94a9d1" providerId="ADAL" clId="{1D9303ED-E82D-4FA1-A83D-93429506A345}" dt="2022-04-07T09:57:52.015" v="158" actId="20577"/>
+      <pc:chgData name="William Brugge, van der" userId="cd30b346-2f8f-43b5-80cb-537f8c94a9d1" providerId="ADAL" clId="{1D9303ED-E82D-4FA1-A83D-93429506A345}" dt="2022-04-10T12:39:00.987" v="172" actId="1076"/>
       <pc:docMkLst>
         <pc:docMk/>
       </pc:docMkLst>
+      <pc:sldChg chg="addSp delSp modSp mod">
+        <pc:chgData name="William Brugge, van der" userId="cd30b346-2f8f-43b5-80cb-537f8c94a9d1" providerId="ADAL" clId="{1D9303ED-E82D-4FA1-A83D-93429506A345}" dt="2022-04-10T12:39:00.987" v="172" actId="1076"/>
+        <pc:sldMkLst>
+          <pc:docMk/>
+          <pc:sldMk cId="611515372" sldId="261"/>
+        </pc:sldMkLst>
+        <pc:spChg chg="del">
+          <ac:chgData name="William Brugge, van der" userId="cd30b346-2f8f-43b5-80cb-537f8c94a9d1" providerId="ADAL" clId="{1D9303ED-E82D-4FA1-A83D-93429506A345}" dt="2022-04-10T12:38:13.078" v="159"/>
+          <ac:spMkLst>
+            <pc:docMk/>
+            <pc:sldMk cId="611515372" sldId="261"/>
+            <ac:spMk id="3" creationId="{3604FC74-668D-42AE-BD89-3974F6F72BC8}"/>
+          </ac:spMkLst>
+        </pc:spChg>
+        <pc:picChg chg="add mod">
+          <ac:chgData name="William Brugge, van der" userId="cd30b346-2f8f-43b5-80cb-537f8c94a9d1" providerId="ADAL" clId="{1D9303ED-E82D-4FA1-A83D-93429506A345}" dt="2022-04-10T12:38:53.825" v="170" actId="14100"/>
+          <ac:picMkLst>
+            <pc:docMk/>
+            <pc:sldMk cId="611515372" sldId="261"/>
+            <ac:picMk id="5" creationId="{0070FF4D-9443-429F-8F98-C7B782E3804A}"/>
+          </ac:picMkLst>
+        </pc:picChg>
+        <pc:picChg chg="add mod">
+          <ac:chgData name="William Brugge, van der" userId="cd30b346-2f8f-43b5-80cb-537f8c94a9d1" providerId="ADAL" clId="{1D9303ED-E82D-4FA1-A83D-93429506A345}" dt="2022-04-10T12:39:00.987" v="172" actId="1076"/>
+          <ac:picMkLst>
+            <pc:docMk/>
+            <pc:sldMk cId="611515372" sldId="261"/>
+            <ac:picMk id="7" creationId="{FB4735DE-0746-4F00-AC03-03D981909567}"/>
+          </ac:picMkLst>
+        </pc:picChg>
+      </pc:sldChg>
       <pc:sldChg chg="modSp new mod">
         <pc:chgData name="William Brugge, van der" userId="cd30b346-2f8f-43b5-80cb-537f8c94a9d1" providerId="ADAL" clId="{1D9303ED-E82D-4FA1-A83D-93429506A345}" dt="2022-04-07T09:57:52.015" v="158" actId="20577"/>
         <pc:sldMkLst>
@@ -311,7 +350,7 @@
           <a:p>
             <a:fld id="{02AC24A9-CCB6-4F8D-B8DB-C2F3692CFA5A}" type="datetimeFigureOut">
               <a:rPr lang="en-US" smtClean="0"/>
-              <a:t>4/7/2022</a:t>
+              <a:t>4/10/2022</a:t>
             </a:fld>
             <a:endParaRPr lang="en-US" dirty="0"/>
           </a:p>
@@ -681,7 +720,7 @@
           <a:p>
             <a:fld id="{02AC24A9-CCB6-4F8D-B8DB-C2F3692CFA5A}" type="datetimeFigureOut">
               <a:rPr lang="en-US" smtClean="0"/>
-              <a:t>4/7/2022</a:t>
+              <a:t>4/10/2022</a:t>
             </a:fld>
             <a:endParaRPr lang="en-US"/>
           </a:p>
@@ -890,7 +929,7 @@
           <a:p>
             <a:fld id="{02AC24A9-CCB6-4F8D-B8DB-C2F3692CFA5A}" type="datetimeFigureOut">
               <a:rPr lang="en-US" smtClean="0"/>
-              <a:t>4/7/2022</a:t>
+              <a:t>4/10/2022</a:t>
             </a:fld>
             <a:endParaRPr lang="en-US"/>
           </a:p>
@@ -1360,7 +1399,7 @@
           <a:p>
             <a:fld id="{02AC24A9-CCB6-4F8D-B8DB-C2F3692CFA5A}" type="datetimeFigureOut">
               <a:rPr lang="en-US" smtClean="0"/>
-              <a:t>4/7/2022</a:t>
+              <a:t>4/10/2022</a:t>
             </a:fld>
             <a:endParaRPr lang="en-US"/>
           </a:p>
@@ -1814,7 +1853,7 @@
           <a:p>
             <a:fld id="{02AC24A9-CCB6-4F8D-B8DB-C2F3692CFA5A}" type="datetimeFigureOut">
               <a:rPr lang="en-US" smtClean="0"/>
-              <a:t>4/7/2022</a:t>
+              <a:t>4/10/2022</a:t>
             </a:fld>
             <a:endParaRPr lang="en-US"/>
           </a:p>
@@ -2346,7 +2385,7 @@
           <a:p>
             <a:fld id="{02AC24A9-CCB6-4F8D-B8DB-C2F3692CFA5A}" type="datetimeFigureOut">
               <a:rPr lang="en-US" smtClean="0"/>
-              <a:t>4/7/2022</a:t>
+              <a:t>4/10/2022</a:t>
             </a:fld>
             <a:endParaRPr lang="en-US"/>
           </a:p>
@@ -3045,7 +3084,7 @@
           <a:p>
             <a:fld id="{02AC24A9-CCB6-4F8D-B8DB-C2F3692CFA5A}" type="datetimeFigureOut">
               <a:rPr lang="en-US" smtClean="0"/>
-              <a:t>4/7/2022</a:t>
+              <a:t>4/10/2022</a:t>
             </a:fld>
             <a:endParaRPr lang="en-US"/>
           </a:p>
@@ -3374,7 +3413,7 @@
           <a:p>
             <a:fld id="{02AC24A9-CCB6-4F8D-B8DB-C2F3692CFA5A}" type="datetimeFigureOut">
               <a:rPr lang="en-US" smtClean="0"/>
-              <a:t>4/7/2022</a:t>
+              <a:t>4/10/2022</a:t>
             </a:fld>
             <a:endParaRPr lang="en-US"/>
           </a:p>
@@ -3487,7 +3526,7 @@
           <a:p>
             <a:fld id="{02AC24A9-CCB6-4F8D-B8DB-C2F3692CFA5A}" type="datetimeFigureOut">
               <a:rPr lang="en-US" smtClean="0"/>
-              <a:t>4/7/2022</a:t>
+              <a:t>4/10/2022</a:t>
             </a:fld>
             <a:endParaRPr lang="en-US"/>
           </a:p>
@@ -3982,7 +4021,7 @@
           <a:p>
             <a:fld id="{02AC24A9-CCB6-4F8D-B8DB-C2F3692CFA5A}" type="datetimeFigureOut">
               <a:rPr lang="en-US" smtClean="0"/>
-              <a:t>4/7/2022</a:t>
+              <a:t>4/10/2022</a:t>
             </a:fld>
             <a:endParaRPr lang="en-US" dirty="0"/>
           </a:p>
@@ -4459,7 +4498,7 @@
           <a:p>
             <a:fld id="{02AC24A9-CCB6-4F8D-B8DB-C2F3692CFA5A}" type="datetimeFigureOut">
               <a:rPr lang="en-US" smtClean="0"/>
-              <a:t>4/7/2022</a:t>
+              <a:t>4/10/2022</a:t>
             </a:fld>
             <a:endParaRPr lang="en-US"/>
           </a:p>
@@ -4702,7 +4741,7 @@
           <a:p>
             <a:fld id="{02AC24A9-CCB6-4F8D-B8DB-C2F3692CFA5A}" type="datetimeFigureOut">
               <a:rPr lang="en-US" smtClean="0"/>
-              <a:t>4/7/2022</a:t>
+              <a:t>4/10/2022</a:t>
             </a:fld>
             <a:endParaRPr lang="en-US"/>
           </a:p>
@@ -6675,31 +6714,77 @@
           </a:p>
         </p:txBody>
       </p:sp>
-      <p:sp>
-        <p:nvSpPr>
-          <p:cNvPr id="3" name="Tijdelijke aanduiding voor inhoud 2">
-            <a:extLst>
-              <a:ext uri="{FF2B5EF4-FFF2-40B4-BE49-F238E27FC236}">
-                <a16:creationId xmlns:a16="http://schemas.microsoft.com/office/drawing/2014/main" id="{3604FC74-668D-42AE-BD89-3974F6F72BC8}"/>
-              </a:ext>
-            </a:extLst>
-          </p:cNvPr>
-          <p:cNvSpPr>
-            <a:spLocks noGrp="1"/>
-          </p:cNvSpPr>
+      <p:pic>
+        <p:nvPicPr>
+          <p:cNvPr id="5" name="Tijdelijke aanduiding voor inhoud 4" descr="Afbeelding met tekst&#10;&#10;Automatisch gegenereerde beschrijving">
+            <a:extLst>
+              <a:ext uri="{FF2B5EF4-FFF2-40B4-BE49-F238E27FC236}">
+                <a16:creationId xmlns:a16="http://schemas.microsoft.com/office/drawing/2014/main" id="{0070FF4D-9443-429F-8F98-C7B782E3804A}"/>
+              </a:ext>
+            </a:extLst>
+          </p:cNvPr>
+          <p:cNvPicPr>
+            <a:picLocks noGrp="1" noChangeAspect="1"/>
+          </p:cNvPicPr>
           <p:nvPr>
             <p:ph idx="1"/>
           </p:nvPr>
-        </p:nvSpPr>
-        <p:spPr/>
-        <p:txBody>
-          <a:bodyPr/>
-          <a:lstStyle/>
-          <a:p>
-            <a:endParaRPr lang="en-NL" dirty="0"/>
-          </a:p>
-        </p:txBody>
-      </p:sp>
+        </p:nvPicPr>
+        <p:blipFill>
+          <a:blip r:embed="rId2">
+            <a:extLst>
+              <a:ext uri="{28A0092B-C50C-407E-A947-70E740481C1C}">
+                <a14:useLocalDpi xmlns:a14="http://schemas.microsoft.com/office/drawing/2010/main" val="0"/>
+              </a:ext>
+            </a:extLst>
+          </a:blip>
+          <a:stretch>
+            <a:fillRect/>
+          </a:stretch>
+        </p:blipFill>
+        <p:spPr>
+          <a:xfrm>
+            <a:off x="6278315" y="379562"/>
+            <a:ext cx="5568956" cy="6189454"/>
+          </a:xfrm>
+        </p:spPr>
+      </p:pic>
+      <p:pic>
+        <p:nvPicPr>
+          <p:cNvPr id="7" name="Afbeelding 6">
+            <a:extLst>
+              <a:ext uri="{FF2B5EF4-FFF2-40B4-BE49-F238E27FC236}">
+                <a16:creationId xmlns:a16="http://schemas.microsoft.com/office/drawing/2014/main" id="{FB4735DE-0746-4F00-AC03-03D981909567}"/>
+              </a:ext>
+            </a:extLst>
+          </p:cNvPr>
+          <p:cNvPicPr>
+            <a:picLocks noChangeAspect="1"/>
+          </p:cNvPicPr>
+          <p:nvPr/>
+        </p:nvPicPr>
+        <p:blipFill>
+          <a:blip r:embed="rId3">
+            <a:extLst>
+              <a:ext uri="{28A0092B-C50C-407E-A947-70E740481C1C}">
+                <a14:useLocalDpi xmlns:a14="http://schemas.microsoft.com/office/drawing/2010/main" val="0"/>
+              </a:ext>
+            </a:extLst>
+          </a:blip>
+          <a:stretch>
+            <a:fillRect/>
+          </a:stretch>
+        </p:blipFill>
+        <p:spPr>
+          <a:xfrm>
+            <a:off x="189453" y="2173551"/>
+            <a:ext cx="5823158" cy="3036219"/>
+          </a:xfrm>
+          <a:prstGeom prst="rect">
+            <a:avLst/>
+          </a:prstGeom>
+        </p:spPr>
+      </p:pic>
     </p:spTree>
     <p:extLst>
       <p:ext uri="{BB962C8B-B14F-4D97-AF65-F5344CB8AC3E}">

</xml_diff>